<commit_message>
adding Mon and Wed schedule
</commit_message>
<xml_diff>
--- a/data/slides/day_03/MiniPresentation.pptx
+++ b/data/slides/day_03/MiniPresentation.pptx
@@ -6,8 +6,10 @@
   </p:sldMasterIdLst>
   <p:sldIdLst>
     <p:sldId id="256" r:id="rId2"/>
-    <p:sldId id="257" r:id="rId3"/>
-    <p:sldId id="258" r:id="rId4"/>
+    <p:sldId id="260" r:id="rId3"/>
+    <p:sldId id="257" r:id="rId4"/>
+    <p:sldId id="259" r:id="rId5"/>
+    <p:sldId id="258" r:id="rId6"/>
   </p:sldIdLst>
   <p:sldSz cx="12192000" cy="6858000"/>
   <p:notesSz cx="6858000" cy="9144000"/>
@@ -3427,6 +3429,116 @@
           <p:cNvPr id="2" name="Title 1">
             <a:extLst>
               <a:ext uri="{FF2B5EF4-FFF2-40B4-BE49-F238E27FC236}">
+                <a16:creationId xmlns:a16="http://schemas.microsoft.com/office/drawing/2014/main" id="{0343A6F4-5D98-7D46-8454-3BCB0C6B35A4}"/>
+              </a:ext>
+            </a:extLst>
+          </p:cNvPr>
+          <p:cNvSpPr>
+            <a:spLocks noGrp="1"/>
+          </p:cNvSpPr>
+          <p:nvPr>
+            <p:ph type="title"/>
+          </p:nvPr>
+        </p:nvSpPr>
+        <p:spPr/>
+        <p:txBody>
+          <a:bodyPr/>
+          <a:lstStyle/>
+          <a:p>
+            <a:r>
+              <a:rPr lang="en-US" dirty="0"/>
+              <a:t>Vote Here: </a:t>
+            </a:r>
+          </a:p>
+        </p:txBody>
+      </p:sp>
+      <p:sp>
+        <p:nvSpPr>
+          <p:cNvPr id="3" name="Content Placeholder 2">
+            <a:extLst>
+              <a:ext uri="{FF2B5EF4-FFF2-40B4-BE49-F238E27FC236}">
+                <a16:creationId xmlns:a16="http://schemas.microsoft.com/office/drawing/2014/main" id="{CC565B83-E163-8C4E-9D78-3791A4D73325}"/>
+              </a:ext>
+            </a:extLst>
+          </p:cNvPr>
+          <p:cNvSpPr>
+            <a:spLocks noGrp="1"/>
+          </p:cNvSpPr>
+          <p:nvPr>
+            <p:ph idx="1"/>
+          </p:nvPr>
+        </p:nvSpPr>
+        <p:spPr/>
+        <p:txBody>
+          <a:bodyPr/>
+          <a:lstStyle/>
+          <a:p>
+            <a:r>
+              <a:rPr lang="en-US" dirty="0">
+                <a:hlinkClick r:id="rId2"/>
+              </a:rPr>
+              <a:t>https://forms.gle/qHQKfFCeDR5Z2BKR9</a:t>
+            </a:r>
+            <a:r>
+              <a:rPr lang="en-US" dirty="0"/>
+              <a:t> </a:t>
+            </a:r>
+          </a:p>
+          <a:p>
+            <a:endParaRPr lang="en-US" dirty="0"/>
+          </a:p>
+          <a:p>
+            <a:endParaRPr lang="en-US" dirty="0"/>
+          </a:p>
+          <a:p>
+            <a:r>
+              <a:rPr lang="en-US" dirty="0">
+                <a:hlinkClick r:id="rId3"/>
+              </a:rPr>
+              <a:t>https://tinyurl.com/miniprojectbootcamp</a:t>
+            </a:r>
+            <a:r>
+              <a:rPr lang="en-US"/>
+              <a:t> </a:t>
+            </a:r>
+          </a:p>
+        </p:txBody>
+      </p:sp>
+    </p:spTree>
+    <p:extLst>
+      <p:ext uri="{BB962C8B-B14F-4D97-AF65-F5344CB8AC3E}">
+        <p14:creationId xmlns:p14="http://schemas.microsoft.com/office/powerpoint/2010/main" val="1482586937"/>
+      </p:ext>
+    </p:extLst>
+  </p:cSld>
+  <p:clrMapOvr>
+    <a:masterClrMapping/>
+  </p:clrMapOvr>
+</p:sld>
+</file>
+
+<file path=ppt/slides/slide3.xml><?xml version="1.0" encoding="utf-8"?>
+<p:sld xmlns:a="http://schemas.openxmlformats.org/drawingml/2006/main" xmlns:r="http://schemas.openxmlformats.org/officeDocument/2006/relationships" xmlns:p="http://schemas.openxmlformats.org/presentationml/2006/main">
+  <p:cSld>
+    <p:spTree>
+      <p:nvGrpSpPr>
+        <p:cNvPr id="1" name=""/>
+        <p:cNvGrpSpPr/>
+        <p:nvPr/>
+      </p:nvGrpSpPr>
+      <p:grpSpPr>
+        <a:xfrm>
+          <a:off x="0" y="0"/>
+          <a:ext cx="0" cy="0"/>
+          <a:chOff x="0" y="0"/>
+          <a:chExt cx="0" cy="0"/>
+        </a:xfrm>
+      </p:grpSpPr>
+      <p:sp>
+        <p:nvSpPr>
+          <p:cNvPr id="2" name="Title 1">
+            <a:extLst>
+              <a:ext uri="{FF2B5EF4-FFF2-40B4-BE49-F238E27FC236}">
                 <a16:creationId xmlns:a16="http://schemas.microsoft.com/office/drawing/2014/main" id="{995110D9-4B29-7447-A37E-FC65BADF463A}"/>
               </a:ext>
             </a:extLst>
@@ -3512,7 +3624,137 @@
 </p:sld>
 </file>
 
-<file path=ppt/slides/slide3.xml><?xml version="1.0" encoding="utf-8"?>
+<file path=ppt/slides/slide4.xml><?xml version="1.0" encoding="utf-8"?>
+<p:sld xmlns:a="http://schemas.openxmlformats.org/drawingml/2006/main" xmlns:r="http://schemas.openxmlformats.org/officeDocument/2006/relationships" xmlns:p="http://schemas.openxmlformats.org/presentationml/2006/main">
+  <p:cSld>
+    <p:spTree>
+      <p:nvGrpSpPr>
+        <p:cNvPr id="1" name=""/>
+        <p:cNvGrpSpPr/>
+        <p:nvPr/>
+      </p:nvGrpSpPr>
+      <p:grpSpPr>
+        <a:xfrm>
+          <a:off x="0" y="0"/>
+          <a:ext cx="0" cy="0"/>
+          <a:chOff x="0" y="0"/>
+          <a:chExt cx="0" cy="0"/>
+        </a:xfrm>
+      </p:grpSpPr>
+      <p:sp>
+        <p:nvSpPr>
+          <p:cNvPr id="2" name="Title 1">
+            <a:extLst>
+              <a:ext uri="{FF2B5EF4-FFF2-40B4-BE49-F238E27FC236}">
+                <a16:creationId xmlns:a16="http://schemas.microsoft.com/office/drawing/2014/main" id="{A102D384-E63E-4A4A-AB15-18DC02117305}"/>
+              </a:ext>
+            </a:extLst>
+          </p:cNvPr>
+          <p:cNvSpPr>
+            <a:spLocks noGrp="1"/>
+          </p:cNvSpPr>
+          <p:nvPr>
+            <p:ph type="title"/>
+          </p:nvPr>
+        </p:nvSpPr>
+        <p:spPr/>
+        <p:txBody>
+          <a:bodyPr/>
+          <a:lstStyle/>
+          <a:p>
+            <a:r>
+              <a:rPr lang="en-US" dirty="0"/>
+              <a:t>Datasets</a:t>
+            </a:r>
+          </a:p>
+        </p:txBody>
+      </p:sp>
+      <p:sp>
+        <p:nvSpPr>
+          <p:cNvPr id="3" name="Content Placeholder 2">
+            <a:extLst>
+              <a:ext uri="{FF2B5EF4-FFF2-40B4-BE49-F238E27FC236}">
+                <a16:creationId xmlns:a16="http://schemas.microsoft.com/office/drawing/2014/main" id="{6452AE9B-D7AF-3D4A-BE98-E9404049F225}"/>
+              </a:ext>
+            </a:extLst>
+          </p:cNvPr>
+          <p:cNvSpPr>
+            <a:spLocks noGrp="1"/>
+          </p:cNvSpPr>
+          <p:nvPr>
+            <p:ph idx="1"/>
+          </p:nvPr>
+        </p:nvSpPr>
+        <p:spPr>
+          <a:xfrm>
+            <a:off x="838199" y="1825625"/>
+            <a:ext cx="4071425" cy="4351338"/>
+          </a:xfrm>
+        </p:spPr>
+        <p:txBody>
+          <a:bodyPr/>
+          <a:lstStyle/>
+          <a:p>
+            <a:r>
+              <a:rPr lang="en-US" dirty="0">
+                <a:hlinkClick r:id="rId2"/>
+              </a:rPr>
+              <a:t>https://perso.telecom-paristech.fr/eagan/class/igr204/datasets</a:t>
+            </a:r>
+            <a:endParaRPr lang="en-US" dirty="0"/>
+          </a:p>
+          <a:p>
+            <a:endParaRPr lang="en-US" dirty="0"/>
+          </a:p>
+          <a:p>
+            <a:endParaRPr lang="en-US" dirty="0"/>
+          </a:p>
+        </p:txBody>
+      </p:sp>
+      <p:pic>
+        <p:nvPicPr>
+          <p:cNvPr id="5" name="Picture 4">
+            <a:extLst>
+              <a:ext uri="{FF2B5EF4-FFF2-40B4-BE49-F238E27FC236}">
+                <a16:creationId xmlns:a16="http://schemas.microsoft.com/office/drawing/2014/main" id="{2ECB8277-7517-D340-9166-18A9CB7FAF04}"/>
+              </a:ext>
+            </a:extLst>
+          </p:cNvPr>
+          <p:cNvPicPr>
+            <a:picLocks noChangeAspect="1"/>
+          </p:cNvPicPr>
+          <p:nvPr/>
+        </p:nvPicPr>
+        <p:blipFill>
+          <a:blip r:embed="rId3"/>
+          <a:stretch>
+            <a:fillRect/>
+          </a:stretch>
+        </p:blipFill>
+        <p:spPr>
+          <a:xfrm>
+            <a:off x="5556738" y="541759"/>
+            <a:ext cx="6425515" cy="6090972"/>
+          </a:xfrm>
+          <a:prstGeom prst="rect">
+            <a:avLst/>
+          </a:prstGeom>
+        </p:spPr>
+      </p:pic>
+    </p:spTree>
+    <p:extLst>
+      <p:ext uri="{BB962C8B-B14F-4D97-AF65-F5344CB8AC3E}">
+        <p14:creationId xmlns:p14="http://schemas.microsoft.com/office/powerpoint/2010/main" val="464317757"/>
+      </p:ext>
+    </p:extLst>
+  </p:cSld>
+  <p:clrMapOvr>
+    <a:masterClrMapping/>
+  </p:clrMapOvr>
+</p:sld>
+</file>
+
+<file path=ppt/slides/slide5.xml><?xml version="1.0" encoding="utf-8"?>
 <p:sld xmlns:a="http://schemas.openxmlformats.org/drawingml/2006/main" xmlns:r="http://schemas.openxmlformats.org/officeDocument/2006/relationships" xmlns:p="http://schemas.openxmlformats.org/presentationml/2006/main">
   <p:cSld>
     <p:spTree>

</xml_diff>